<commit_message>
Arrumando os obstaculos da fase tres do jogo atualizando a apresentação do tcc
</commit_message>
<xml_diff>
--- a/Doc/Apresentacao TCCII.pptx
+++ b/Doc/Apresentacao TCCII.pptx
@@ -20,13 +20,13 @@
     <p:sldId id="275" r:id="rId11"/>
     <p:sldId id="266" r:id="rId12"/>
     <p:sldId id="276" r:id="rId13"/>
-    <p:sldId id="278" r:id="rId14"/>
-    <p:sldId id="279" r:id="rId15"/>
-    <p:sldId id="280" r:id="rId16"/>
-    <p:sldId id="281" r:id="rId17"/>
-    <p:sldId id="283" r:id="rId18"/>
-    <p:sldId id="284" r:id="rId19"/>
-    <p:sldId id="285" r:id="rId20"/>
+    <p:sldId id="285" r:id="rId14"/>
+    <p:sldId id="278" r:id="rId15"/>
+    <p:sldId id="279" r:id="rId16"/>
+    <p:sldId id="280" r:id="rId17"/>
+    <p:sldId id="281" r:id="rId18"/>
+    <p:sldId id="283" r:id="rId19"/>
+    <p:sldId id="284" r:id="rId20"/>
     <p:sldId id="268" r:id="rId21"/>
     <p:sldId id="277" r:id="rId22"/>
     <p:sldId id="269" r:id="rId23"/>
@@ -213,7 +213,7 @@
           <a:p>
             <a:fld id="{4E30FFDA-F765-448F-862D-573226814301}" type="datetimeFigureOut">
               <a:rPr lang="pt-BR" smtClean="0"/>
-              <a:t>19/11/2012</a:t>
+              <a:t>20/11/2012</a:t>
             </a:fld>
             <a:endParaRPr lang="pt-BR"/>
           </a:p>
@@ -738,6 +738,120 @@
 </p:notes>
 </file>
 
+<file path=ppt/notesSlides/notesSlide3.xml><?xml version="1.0" encoding="utf-8"?>
+<p:notes xmlns:a="http://schemas.openxmlformats.org/drawingml/2006/main" xmlns:r="http://schemas.openxmlformats.org/officeDocument/2006/relationships" xmlns:p="http://schemas.openxmlformats.org/presentationml/2006/main">
+  <p:cSld>
+    <p:spTree>
+      <p:nvGrpSpPr>
+        <p:cNvPr id="1" name=""/>
+        <p:cNvGrpSpPr/>
+        <p:nvPr/>
+      </p:nvGrpSpPr>
+      <p:grpSpPr>
+        <a:xfrm>
+          <a:off x="0" y="0"/>
+          <a:ext cx="0" cy="0"/>
+          <a:chOff x="0" y="0"/>
+          <a:chExt cx="0" cy="0"/>
+        </a:xfrm>
+      </p:grpSpPr>
+      <p:sp>
+        <p:nvSpPr>
+          <p:cNvPr id="2" name="Espaço Reservado para Imagem de Slide 1"/>
+          <p:cNvSpPr>
+            <a:spLocks noGrp="1" noRot="1" noChangeAspect="1"/>
+          </p:cNvSpPr>
+          <p:nvPr>
+            <p:ph type="sldImg"/>
+          </p:nvPr>
+        </p:nvSpPr>
+        <p:spPr/>
+      </p:sp>
+      <p:sp>
+        <p:nvSpPr>
+          <p:cNvPr id="3" name="Espaço Reservado para Anotações 2"/>
+          <p:cNvSpPr>
+            <a:spLocks noGrp="1"/>
+          </p:cNvSpPr>
+          <p:nvPr>
+            <p:ph type="body" idx="1"/>
+          </p:nvPr>
+        </p:nvSpPr>
+        <p:spPr/>
+        <p:txBody>
+          <a:bodyPr/>
+          <a:lstStyle/>
+          <a:p>
+            <a:r>
+              <a:rPr lang="pt-BR" dirty="0" smtClean="0"/>
+              <a:t>- Com cores bem vivas</a:t>
+            </a:r>
+            <a:r>
+              <a:rPr lang="pt-BR" baseline="0" dirty="0" smtClean="0"/>
+              <a:t> para chamar a atenção do jogador</a:t>
+            </a:r>
+          </a:p>
+          <a:p>
+            <a:r>
+              <a:rPr lang="pt-BR" baseline="0" dirty="0" smtClean="0"/>
+              <a:t>- Todas as fases e interfaces do jogo herdam da classe “</a:t>
+            </a:r>
+            <a:r>
+              <a:rPr lang="pt-BR" sz="1200" kern="1200" dirty="0" err="1" smtClean="0">
+                <a:solidFill>
+                  <a:schemeClr val="tx1"/>
+                </a:solidFill>
+                <a:effectLst/>
+                <a:latin typeface="+mn-lt"/>
+                <a:ea typeface="+mn-ea"/>
+                <a:cs typeface="+mn-cs"/>
+              </a:rPr>
+              <a:t>GameCanvas</a:t>
+            </a:r>
+            <a:r>
+              <a:rPr lang="pt-BR" baseline="0" dirty="0" smtClean="0"/>
+              <a:t>”</a:t>
+            </a:r>
+            <a:endParaRPr lang="pt-BR" dirty="0"/>
+          </a:p>
+        </p:txBody>
+      </p:sp>
+      <p:sp>
+        <p:nvSpPr>
+          <p:cNvPr id="4" name="Espaço Reservado para Número de Slide 3"/>
+          <p:cNvSpPr>
+            <a:spLocks noGrp="1"/>
+          </p:cNvSpPr>
+          <p:nvPr>
+            <p:ph type="sldNum" sz="quarter" idx="10"/>
+          </p:nvPr>
+        </p:nvSpPr>
+        <p:spPr/>
+        <p:txBody>
+          <a:bodyPr/>
+          <a:lstStyle/>
+          <a:p>
+            <a:fld id="{530C4847-FAA1-4AA7-B363-411CE4C88175}" type="slidenum">
+              <a:rPr lang="pt-BR" smtClean="0"/>
+              <a:t>14</a:t>
+            </a:fld>
+            <a:endParaRPr lang="pt-BR"/>
+          </a:p>
+        </p:txBody>
+      </p:sp>
+    </p:spTree>
+    <p:extLst>
+      <p:ext uri="{BB962C8B-B14F-4D97-AF65-F5344CB8AC3E}">
+        <p14:creationId xmlns:p14="http://schemas.microsoft.com/office/powerpoint/2010/main" val="600041335"/>
+      </p:ext>
+    </p:extLst>
+  </p:cSld>
+  <p:clrMapOvr>
+    <a:masterClrMapping/>
+  </p:clrMapOvr>
+</p:notes>
+</file>
+
 <file path=ppt/slideLayouts/slideLayout1.xml><?xml version="1.0" encoding="utf-8"?>
 <p:sldLayout xmlns:a="http://schemas.openxmlformats.org/drawingml/2006/main" xmlns:r="http://schemas.openxmlformats.org/officeDocument/2006/relationships" xmlns:p="http://schemas.openxmlformats.org/presentationml/2006/main" type="title" preserve="1">
   <p:cSld name="Slide de título">
@@ -949,7 +1063,7 @@
             <a:fld id="{8B4871E2-8122-4BB0-BB9B-267F182E014E}" type="datetimeFigureOut">
               <a:rPr lang="pt-BR" smtClean="0"/>
               <a:pPr/>
-              <a:t>19/11/2012</a:t>
+              <a:t>20/11/2012</a:t>
             </a:fld>
             <a:endParaRPr lang="pt-BR"/>
           </a:p>
@@ -1137,7 +1251,7 @@
             <a:fld id="{8B4871E2-8122-4BB0-BB9B-267F182E014E}" type="datetimeFigureOut">
               <a:rPr lang="pt-BR" smtClean="0"/>
               <a:pPr/>
-              <a:t>19/11/2012</a:t>
+              <a:t>20/11/2012</a:t>
             </a:fld>
             <a:endParaRPr lang="pt-BR"/>
           </a:p>
@@ -1321,7 +1435,7 @@
             <a:fld id="{8B4871E2-8122-4BB0-BB9B-267F182E014E}" type="datetimeFigureOut">
               <a:rPr lang="pt-BR" smtClean="0"/>
               <a:pPr/>
-              <a:t>19/11/2012</a:t>
+              <a:t>20/11/2012</a:t>
             </a:fld>
             <a:endParaRPr lang="pt-BR"/>
           </a:p>
@@ -1516,7 +1630,7 @@
             <a:fld id="{8B4871E2-8122-4BB0-BB9B-267F182E014E}" type="datetimeFigureOut">
               <a:rPr lang="pt-BR" smtClean="0"/>
               <a:pPr/>
-              <a:t>19/11/2012</a:t>
+              <a:t>20/11/2012</a:t>
             </a:fld>
             <a:endParaRPr lang="pt-BR"/>
           </a:p>
@@ -1644,7 +1758,7 @@
             <a:fld id="{8B4871E2-8122-4BB0-BB9B-267F182E014E}" type="datetimeFigureOut">
               <a:rPr lang="pt-BR" smtClean="0"/>
               <a:pPr/>
-              <a:t>19/11/2012</a:t>
+              <a:t>20/11/2012</a:t>
             </a:fld>
             <a:endParaRPr lang="pt-BR"/>
           </a:p>
@@ -2035,7 +2149,7 @@
             <a:fld id="{8B4871E2-8122-4BB0-BB9B-267F182E014E}" type="datetimeFigureOut">
               <a:rPr lang="pt-BR" smtClean="0"/>
               <a:pPr/>
-              <a:t>19/11/2012</a:t>
+              <a:t>20/11/2012</a:t>
             </a:fld>
             <a:endParaRPr lang="pt-BR"/>
           </a:p>
@@ -2482,7 +2596,7 @@
             <a:fld id="{8B4871E2-8122-4BB0-BB9B-267F182E014E}" type="datetimeFigureOut">
               <a:rPr lang="pt-BR" smtClean="0"/>
               <a:pPr/>
-              <a:t>19/11/2012</a:t>
+              <a:t>20/11/2012</a:t>
             </a:fld>
             <a:endParaRPr lang="pt-BR"/>
           </a:p>
@@ -2609,7 +2723,7 @@
             <a:fld id="{8B4871E2-8122-4BB0-BB9B-267F182E014E}" type="datetimeFigureOut">
               <a:rPr lang="pt-BR" smtClean="0"/>
               <a:pPr/>
-              <a:t>19/11/2012</a:t>
+              <a:t>20/11/2012</a:t>
             </a:fld>
             <a:endParaRPr lang="pt-BR"/>
           </a:p>
@@ -2708,7 +2822,7 @@
             <a:fld id="{8B4871E2-8122-4BB0-BB9B-267F182E014E}" type="datetimeFigureOut">
               <a:rPr lang="pt-BR" smtClean="0"/>
               <a:pPr/>
-              <a:t>19/11/2012</a:t>
+              <a:t>20/11/2012</a:t>
             </a:fld>
             <a:endParaRPr lang="pt-BR"/>
           </a:p>
@@ -3001,7 +3115,7 @@
             <a:fld id="{8B4871E2-8122-4BB0-BB9B-267F182E014E}" type="datetimeFigureOut">
               <a:rPr lang="pt-BR" smtClean="0"/>
               <a:pPr/>
-              <a:t>19/11/2012</a:t>
+              <a:t>20/11/2012</a:t>
             </a:fld>
             <a:endParaRPr lang="pt-BR"/>
           </a:p>
@@ -3272,7 +3386,7 @@
             <a:fld id="{8B4871E2-8122-4BB0-BB9B-267F182E014E}" type="datetimeFigureOut">
               <a:rPr lang="pt-BR" smtClean="0"/>
               <a:pPr/>
-              <a:t>19/11/2012</a:t>
+              <a:t>20/11/2012</a:t>
             </a:fld>
             <a:endParaRPr lang="pt-BR"/>
           </a:p>
@@ -3557,7 +3671,7 @@
             <a:fld id="{8B4871E2-8122-4BB0-BB9B-267F182E014E}" type="datetimeFigureOut">
               <a:rPr lang="pt-BR" smtClean="0"/>
               <a:pPr/>
-              <a:t>19/11/2012</a:t>
+              <a:t>20/11/2012</a:t>
             </a:fld>
             <a:endParaRPr lang="pt-BR"/>
           </a:p>
@@ -4194,15 +4308,7 @@
             <a:pPr algn="just"/>
             <a:r>
               <a:rPr lang="pt-BR" sz="4000" dirty="0" smtClean="0"/>
-              <a:t>Jogos Digitais </a:t>
-            </a:r>
-            <a:r>
-              <a:rPr lang="pt-BR" sz="4000" dirty="0" smtClean="0"/>
-              <a:t>e </a:t>
-            </a:r>
-            <a:r>
-              <a:rPr lang="pt-BR" sz="4000" dirty="0" smtClean="0"/>
-              <a:t>Inteligência Artificial</a:t>
+              <a:t>Jogos Digitais e Inteligência Artificial</a:t>
             </a:r>
             <a:endParaRPr lang="pt-BR" sz="4000" dirty="0"/>
           </a:p>
@@ -4281,15 +4387,7 @@
           <a:p>
             <a:r>
               <a:rPr lang="pt-BR" sz="3000" dirty="0" smtClean="0"/>
-              <a:t>Tríade </a:t>
-            </a:r>
-            <a:r>
-              <a:rPr lang="pt-BR" sz="3000" dirty="0" smtClean="0"/>
-              <a:t>Revolução </a:t>
-            </a:r>
-            <a:r>
-              <a:rPr lang="pt-BR" sz="3000" dirty="0" smtClean="0"/>
-              <a:t>francesa;</a:t>
+              <a:t>Tríade Revolução francesa;</a:t>
             </a:r>
           </a:p>
           <a:p>
@@ -4469,7 +4567,6 @@
               <a:rPr lang="pt-BR" sz="3200" dirty="0" smtClean="0"/>
               <a:t>Gênero</a:t>
             </a:r>
-            <a:endParaRPr lang="pt-BR" sz="3200" dirty="0" smtClean="0"/>
           </a:p>
           <a:p>
             <a:r>
@@ -4482,7 +4579,6 @@
               <a:rPr lang="pt-BR" sz="3200" dirty="0" smtClean="0"/>
               <a:t>Java</a:t>
             </a:r>
-            <a:endParaRPr lang="pt-BR" sz="3200" dirty="0" smtClean="0"/>
           </a:p>
           <a:p>
             <a:endParaRPr lang="pt-BR" sz="3600" dirty="0" smtClean="0"/>
@@ -4572,8 +4668,8 @@
         </p:nvSpPr>
         <p:spPr>
           <a:xfrm>
-            <a:off x="457200" y="1628801"/>
-            <a:ext cx="5554960" cy="1656184"/>
+            <a:off x="457200" y="1628800"/>
+            <a:ext cx="7211144" cy="3744416"/>
           </a:xfrm>
         </p:spPr>
         <p:txBody>
@@ -4585,6 +4681,82 @@
             <a:endParaRPr lang="pt-BR" sz="3200" dirty="0" smtClean="0"/>
           </a:p>
           <a:p>
+            <a:r>
+              <a:rPr lang="pt-BR" sz="3200" dirty="0"/>
+              <a:t> </a:t>
+            </a:r>
+            <a:r>
+              <a:rPr lang="pt-BR" sz="3200" dirty="0" smtClean="0"/>
+              <a:t>Histórico desenvolvimento</a:t>
+            </a:r>
+          </a:p>
+          <a:p>
+            <a:pPr lvl="1"/>
+            <a:r>
+              <a:rPr lang="pt-BR" sz="2800" dirty="0" smtClean="0"/>
+              <a:t>Curso extensão </a:t>
+            </a:r>
+          </a:p>
+          <a:p>
+            <a:pPr lvl="1"/>
+            <a:r>
+              <a:rPr lang="pt-BR" sz="2800" dirty="0" smtClean="0"/>
+              <a:t> Nenhum recurso externo</a:t>
+            </a:r>
+          </a:p>
+          <a:p>
+            <a:pPr lvl="1"/>
+            <a:r>
+              <a:rPr lang="pt-BR" sz="2800" dirty="0" smtClean="0"/>
+              <a:t>Classes</a:t>
+            </a:r>
+          </a:p>
+          <a:p>
+            <a:pPr marL="228600" lvl="1" indent="0">
+              <a:buNone/>
+            </a:pPr>
+            <a:r>
+              <a:rPr lang="pt-BR" sz="2400" dirty="0" smtClean="0">
+                <a:solidFill>
+                  <a:schemeClr val="tx1"/>
+                </a:solidFill>
+              </a:rPr>
+              <a:t>“</a:t>
+            </a:r>
+            <a:r>
+              <a:rPr lang="pt-BR" sz="2400" dirty="0" err="1">
+                <a:solidFill>
+                  <a:schemeClr val="tx1"/>
+                </a:solidFill>
+              </a:rPr>
+              <a:t>GameCanvas</a:t>
+            </a:r>
+            <a:r>
+              <a:rPr lang="pt-BR" sz="2400" dirty="0" smtClean="0">
+                <a:solidFill>
+                  <a:schemeClr val="tx1"/>
+                </a:solidFill>
+              </a:rPr>
+              <a:t>”, “</a:t>
+            </a:r>
+            <a:r>
+              <a:rPr lang="pt-BR" sz="2400" dirty="0" err="1" smtClean="0">
+                <a:solidFill>
+                  <a:schemeClr val="tx1"/>
+                </a:solidFill>
+              </a:rPr>
+              <a:t>GamePanel</a:t>
+            </a:r>
+            <a:r>
+              <a:rPr lang="pt-BR" sz="2400" dirty="0" smtClean="0">
+                <a:solidFill>
+                  <a:schemeClr val="tx1"/>
+                </a:solidFill>
+              </a:rPr>
+              <a:t>”</a:t>
+            </a:r>
+          </a:p>
+          <a:p>
             <a:endParaRPr lang="pt-BR" sz="3600" dirty="0" smtClean="0"/>
           </a:p>
           <a:p>
@@ -4616,75 +4788,16 @@
           <a:p>
             <a:pPr algn="l"/>
             <a:r>
-              <a:rPr lang="pt-BR" sz="4000" dirty="0" smtClean="0"/>
-              <a:t>Interface</a:t>
-            </a:r>
-            <a:r>
-              <a:rPr lang="pt-BR" sz="4000" dirty="0" smtClean="0"/>
-              <a:t> </a:t>
-            </a:r>
-            <a:endParaRPr lang="pt-BR" sz="4000" dirty="0"/>
-          </a:p>
-        </p:txBody>
-      </p:sp>
-      <p:pic>
-        <p:nvPicPr>
-          <p:cNvPr id="1026" name="Imagem 1"/>
-          <p:cNvPicPr>
-            <a:picLocks noChangeAspect="1" noChangeArrowheads="1"/>
-          </p:cNvPicPr>
-          <p:nvPr/>
-        </p:nvPicPr>
-        <p:blipFill>
-          <a:blip r:embed="rId2">
-            <a:extLst>
-              <a:ext uri="{28A0092B-C50C-407E-A947-70E740481C1C}">
-                <a14:useLocalDpi xmlns:a14="http://schemas.microsoft.com/office/drawing/2010/main" val="0"/>
-              </a:ext>
-            </a:extLst>
-          </a:blip>
-          <a:srcRect/>
-          <a:stretch>
-            <a:fillRect/>
-          </a:stretch>
-        </p:blipFill>
-        <p:spPr bwMode="auto">
-          <a:xfrm>
-            <a:off x="1475656" y="1772816"/>
-            <a:ext cx="5976664" cy="4148988"/>
-          </a:xfrm>
-          <a:prstGeom prst="rect">
-            <a:avLst/>
-          </a:prstGeom>
-          <a:noFill/>
-          <a:ln>
-            <a:noFill/>
-          </a:ln>
-          <a:extLst>
-            <a:ext uri="{909E8E84-426E-40DD-AFC4-6F175D3DCCD1}">
-              <a14:hiddenFill xmlns:a14="http://schemas.microsoft.com/office/drawing/2010/main">
-                <a:solidFill>
-                  <a:srgbClr val="FFFFFF"/>
-                </a:solidFill>
-              </a14:hiddenFill>
-            </a:ext>
-            <a:ext uri="{91240B29-F687-4F45-9708-019B960494DF}">
-              <a14:hiddenLine xmlns:a14="http://schemas.microsoft.com/office/drawing/2010/main" w="9525">
-                <a:solidFill>
-                  <a:srgbClr val="000000"/>
-                </a:solidFill>
-                <a:miter lim="800000"/>
-                <a:headEnd/>
-                <a:tailEnd/>
-              </a14:hiddenLine>
-            </a:ext>
-          </a:extLst>
-        </p:spPr>
-      </p:pic>
+              <a:rPr lang="pt-BR" sz="4000" dirty="0"/>
+              <a:t>Projeto/Desenvolvimento </a:t>
+            </a:r>
+          </a:p>
+        </p:txBody>
+      </p:sp>
     </p:spTree>
     <p:extLst>
       <p:ext uri="{BB962C8B-B14F-4D97-AF65-F5344CB8AC3E}">
-        <p14:creationId xmlns:p14="http://schemas.microsoft.com/office/powerpoint/2010/main" val="1422756804"/>
+        <p14:creationId xmlns:p14="http://schemas.microsoft.com/office/powerpoint/2010/main" val="722848786"/>
       </p:ext>
     </p:extLst>
   </p:cSld>
@@ -4775,7 +4888,7 @@
             <a:pPr algn="l"/>
             <a:r>
               <a:rPr lang="pt-BR" sz="4000" dirty="0" smtClean="0"/>
-              <a:t>Fases</a:t>
+              <a:t>Interface </a:t>
             </a:r>
             <a:endParaRPr lang="pt-BR" sz="4000" dirty="0"/>
           </a:p>
@@ -4783,14 +4896,14 @@
       </p:sp>
       <p:pic>
         <p:nvPicPr>
-          <p:cNvPr id="2050" name="Imagem 1"/>
+          <p:cNvPr id="1026" name="Imagem 1"/>
           <p:cNvPicPr>
             <a:picLocks noChangeAspect="1" noChangeArrowheads="1"/>
           </p:cNvPicPr>
           <p:nvPr/>
         </p:nvPicPr>
         <p:blipFill>
-          <a:blip r:embed="rId2" cstate="print">
+          <a:blip r:embed="rId3">
             <a:extLst>
               <a:ext uri="{28A0092B-C50C-407E-A947-70E740481C1C}">
                 <a14:useLocalDpi xmlns:a14="http://schemas.microsoft.com/office/drawing/2010/main" val="0"/>
@@ -4804,8 +4917,8 @@
         </p:blipFill>
         <p:spPr bwMode="auto">
           <a:xfrm>
-            <a:off x="683569" y="1484784"/>
-            <a:ext cx="3600400" cy="2499984"/>
+            <a:off x="1475656" y="1772816"/>
+            <a:ext cx="5976664" cy="4148988"/>
           </a:xfrm>
           <a:prstGeom prst="rect">
             <a:avLst/>
@@ -4835,118 +4948,10 @@
           </a:extLst>
         </p:spPr>
       </p:pic>
-      <p:pic>
-        <p:nvPicPr>
-          <p:cNvPr id="2051" name="Imagem 1"/>
-          <p:cNvPicPr>
-            <a:picLocks noChangeAspect="1" noChangeArrowheads="1"/>
-          </p:cNvPicPr>
-          <p:nvPr/>
-        </p:nvPicPr>
-        <p:blipFill>
-          <a:blip r:embed="rId3" cstate="print">
-            <a:extLst>
-              <a:ext uri="{28A0092B-C50C-407E-A947-70E740481C1C}">
-                <a14:useLocalDpi xmlns:a14="http://schemas.microsoft.com/office/drawing/2010/main" val="0"/>
-              </a:ext>
-            </a:extLst>
-          </a:blip>
-          <a:srcRect/>
-          <a:stretch>
-            <a:fillRect/>
-          </a:stretch>
-        </p:blipFill>
-        <p:spPr bwMode="auto">
-          <a:xfrm>
-            <a:off x="4860032" y="1484784"/>
-            <a:ext cx="3656844" cy="2539178"/>
-          </a:xfrm>
-          <a:prstGeom prst="rect">
-            <a:avLst/>
-          </a:prstGeom>
-          <a:noFill/>
-          <a:ln>
-            <a:noFill/>
-          </a:ln>
-          <a:extLst>
-            <a:ext uri="{909E8E84-426E-40DD-AFC4-6F175D3DCCD1}">
-              <a14:hiddenFill xmlns:a14="http://schemas.microsoft.com/office/drawing/2010/main">
-                <a:solidFill>
-                  <a:srgbClr val="FFFFFF"/>
-                </a:solidFill>
-              </a14:hiddenFill>
-            </a:ext>
-            <a:ext uri="{91240B29-F687-4F45-9708-019B960494DF}">
-              <a14:hiddenLine xmlns:a14="http://schemas.microsoft.com/office/drawing/2010/main" w="9525">
-                <a:solidFill>
-                  <a:srgbClr val="000000"/>
-                </a:solidFill>
-                <a:miter lim="800000"/>
-                <a:headEnd/>
-                <a:tailEnd/>
-              </a14:hiddenLine>
-            </a:ext>
-          </a:extLst>
-        </p:spPr>
-      </p:pic>
-      <p:pic>
-        <p:nvPicPr>
-          <p:cNvPr id="2052" name="Imagem 1"/>
-          <p:cNvPicPr>
-            <a:picLocks noChangeAspect="1" noChangeArrowheads="1"/>
-          </p:cNvPicPr>
-          <p:nvPr/>
-        </p:nvPicPr>
-        <p:blipFill>
-          <a:blip r:embed="rId4" cstate="print">
-            <a:extLst>
-              <a:ext uri="{28A0092B-C50C-407E-A947-70E740481C1C}">
-                <a14:useLocalDpi xmlns:a14="http://schemas.microsoft.com/office/drawing/2010/main" val="0"/>
-              </a:ext>
-            </a:extLst>
-          </a:blip>
-          <a:srcRect/>
-          <a:stretch>
-            <a:fillRect/>
-          </a:stretch>
-        </p:blipFill>
-        <p:spPr bwMode="auto">
-          <a:xfrm>
-            <a:off x="2504419" y="4293095"/>
-            <a:ext cx="3559100" cy="2464847"/>
-          </a:xfrm>
-          <a:prstGeom prst="rect">
-            <a:avLst/>
-          </a:prstGeom>
-          <a:noFill/>
-          <a:ln>
-            <a:noFill/>
-          </a:ln>
-          <a:extLst>
-            <a:ext uri="{909E8E84-426E-40DD-AFC4-6F175D3DCCD1}">
-              <a14:hiddenFill xmlns:a14="http://schemas.microsoft.com/office/drawing/2010/main">
-                <a:solidFill>
-                  <a:srgbClr val="FFFFFF"/>
-                </a:solidFill>
-              </a14:hiddenFill>
-            </a:ext>
-            <a:ext uri="{91240B29-F687-4F45-9708-019B960494DF}">
-              <a14:hiddenLine xmlns:a14="http://schemas.microsoft.com/office/drawing/2010/main" w="9525">
-                <a:solidFill>
-                  <a:srgbClr val="000000"/>
-                </a:solidFill>
-                <a:miter lim="800000"/>
-                <a:headEnd/>
-                <a:tailEnd/>
-              </a14:hiddenLine>
-            </a:ext>
-          </a:extLst>
-        </p:spPr>
-      </p:pic>
     </p:spTree>
     <p:extLst>
       <p:ext uri="{BB962C8B-B14F-4D97-AF65-F5344CB8AC3E}">
-        <p14:creationId xmlns:p14="http://schemas.microsoft.com/office/powerpoint/2010/main" val="2382076033"/>
+        <p14:creationId xmlns:p14="http://schemas.microsoft.com/office/powerpoint/2010/main" val="1422756804"/>
       </p:ext>
     </p:extLst>
   </p:cSld>
@@ -5045,7 +5050,7 @@
       </p:sp>
       <p:pic>
         <p:nvPicPr>
-          <p:cNvPr id="3074" name="Imagem 1"/>
+          <p:cNvPr id="2050" name="Imagem 1"/>
           <p:cNvPicPr>
             <a:picLocks noChangeAspect="1" noChangeArrowheads="1"/>
           </p:cNvPicPr>
@@ -5066,8 +5071,8 @@
         </p:blipFill>
         <p:spPr bwMode="auto">
           <a:xfrm>
-            <a:off x="539553" y="1451278"/>
-            <a:ext cx="3744416" cy="2598737"/>
+            <a:off x="683569" y="1484784"/>
+            <a:ext cx="3600400" cy="2499984"/>
           </a:xfrm>
           <a:prstGeom prst="rect">
             <a:avLst/>
@@ -5099,7 +5104,7 @@
       </p:pic>
       <p:pic>
         <p:nvPicPr>
-          <p:cNvPr id="3075" name="Picture 3"/>
+          <p:cNvPr id="2051" name="Imagem 1"/>
           <p:cNvPicPr>
             <a:picLocks noChangeAspect="1" noChangeArrowheads="1"/>
           </p:cNvPicPr>
@@ -5120,8 +5125,8 @@
         </p:blipFill>
         <p:spPr bwMode="auto">
           <a:xfrm>
-            <a:off x="4716016" y="1451279"/>
-            <a:ext cx="3762039" cy="2598737"/>
+            <a:off x="4860032" y="1484784"/>
+            <a:ext cx="3656844" cy="2539178"/>
           </a:xfrm>
           <a:prstGeom prst="rect">
             <a:avLst/>
@@ -5153,7 +5158,7 @@
       </p:pic>
       <p:pic>
         <p:nvPicPr>
-          <p:cNvPr id="3076" name="Picture 4"/>
+          <p:cNvPr id="2052" name="Imagem 1"/>
           <p:cNvPicPr>
             <a:picLocks noChangeAspect="1" noChangeArrowheads="1"/>
           </p:cNvPicPr>
@@ -5174,8 +5179,8 @@
         </p:blipFill>
         <p:spPr bwMode="auto">
           <a:xfrm>
-            <a:off x="2267744" y="4154582"/>
-            <a:ext cx="3816424" cy="2630907"/>
+            <a:off x="2504419" y="4293095"/>
+            <a:ext cx="3559100" cy="2464847"/>
           </a:xfrm>
           <a:prstGeom prst="rect">
             <a:avLst/>
@@ -5208,7 +5213,7 @@
     </p:spTree>
     <p:extLst>
       <p:ext uri="{BB962C8B-B14F-4D97-AF65-F5344CB8AC3E}">
-        <p14:creationId xmlns:p14="http://schemas.microsoft.com/office/powerpoint/2010/main" val="3483655616"/>
+        <p14:creationId xmlns:p14="http://schemas.microsoft.com/office/powerpoint/2010/main" val="2382076033"/>
       </p:ext>
     </p:extLst>
   </p:cSld>
@@ -5299,7 +5304,7 @@
             <a:pPr algn="l"/>
             <a:r>
               <a:rPr lang="pt-BR" sz="4000" dirty="0" smtClean="0"/>
-              <a:t>Personagens</a:t>
+              <a:t>Fases</a:t>
             </a:r>
             <a:endParaRPr lang="pt-BR" sz="4000" dirty="0"/>
           </a:p>
@@ -5307,14 +5312,14 @@
       </p:sp>
       <p:pic>
         <p:nvPicPr>
-          <p:cNvPr id="4098" name="Picture 2" descr="pnovo"/>
+          <p:cNvPr id="3074" name="Imagem 1"/>
           <p:cNvPicPr>
             <a:picLocks noChangeAspect="1" noChangeArrowheads="1"/>
           </p:cNvPicPr>
           <p:nvPr/>
         </p:nvPicPr>
         <p:blipFill>
-          <a:blip r:embed="rId2">
+          <a:blip r:embed="rId2" cstate="print">
             <a:extLst>
               <a:ext uri="{28A0092B-C50C-407E-A947-70E740481C1C}">
                 <a14:useLocalDpi xmlns:a14="http://schemas.microsoft.com/office/drawing/2010/main" val="0"/>
@@ -5328,8 +5333,8 @@
         </p:blipFill>
         <p:spPr bwMode="auto">
           <a:xfrm>
-            <a:off x="1187624" y="1628800"/>
-            <a:ext cx="2978150" cy="2289175"/>
+            <a:off x="539553" y="1451278"/>
+            <a:ext cx="3744416" cy="2598737"/>
           </a:xfrm>
           <a:prstGeom prst="rect">
             <a:avLst/>
@@ -5361,14 +5366,14 @@
       </p:pic>
       <p:pic>
         <p:nvPicPr>
-          <p:cNvPr id="4099" name="Picture 3" descr="bruxa"/>
+          <p:cNvPr id="3075" name="Picture 3"/>
           <p:cNvPicPr>
             <a:picLocks noChangeAspect="1" noChangeArrowheads="1"/>
           </p:cNvPicPr>
           <p:nvPr/>
         </p:nvPicPr>
         <p:blipFill>
-          <a:blip r:embed="rId3">
+          <a:blip r:embed="rId3" cstate="print">
             <a:extLst>
               <a:ext uri="{28A0092B-C50C-407E-A947-70E740481C1C}">
                 <a14:useLocalDpi xmlns:a14="http://schemas.microsoft.com/office/drawing/2010/main" val="0"/>
@@ -5382,8 +5387,8 @@
         </p:blipFill>
         <p:spPr bwMode="auto">
           <a:xfrm>
-            <a:off x="4499992" y="4077072"/>
-            <a:ext cx="3098800" cy="2071687"/>
+            <a:off x="4716016" y="1451279"/>
+            <a:ext cx="3762039" cy="2598737"/>
           </a:xfrm>
           <a:prstGeom prst="rect">
             <a:avLst/>
@@ -5413,10 +5418,64 @@
           </a:extLst>
         </p:spPr>
       </p:pic>
+      <p:pic>
+        <p:nvPicPr>
+          <p:cNvPr id="3076" name="Picture 4"/>
+          <p:cNvPicPr>
+            <a:picLocks noChangeAspect="1" noChangeArrowheads="1"/>
+          </p:cNvPicPr>
+          <p:nvPr/>
+        </p:nvPicPr>
+        <p:blipFill>
+          <a:blip r:embed="rId4" cstate="print">
+            <a:extLst>
+              <a:ext uri="{28A0092B-C50C-407E-A947-70E740481C1C}">
+                <a14:useLocalDpi xmlns:a14="http://schemas.microsoft.com/office/drawing/2010/main" val="0"/>
+              </a:ext>
+            </a:extLst>
+          </a:blip>
+          <a:srcRect/>
+          <a:stretch>
+            <a:fillRect/>
+          </a:stretch>
+        </p:blipFill>
+        <p:spPr bwMode="auto">
+          <a:xfrm>
+            <a:off x="2267744" y="4154582"/>
+            <a:ext cx="3816424" cy="2630907"/>
+          </a:xfrm>
+          <a:prstGeom prst="rect">
+            <a:avLst/>
+          </a:prstGeom>
+          <a:noFill/>
+          <a:ln>
+            <a:noFill/>
+          </a:ln>
+          <a:extLst>
+            <a:ext uri="{909E8E84-426E-40DD-AFC4-6F175D3DCCD1}">
+              <a14:hiddenFill xmlns:a14="http://schemas.microsoft.com/office/drawing/2010/main">
+                <a:solidFill>
+                  <a:srgbClr val="FFFFFF"/>
+                </a:solidFill>
+              </a14:hiddenFill>
+            </a:ext>
+            <a:ext uri="{91240B29-F687-4F45-9708-019B960494DF}">
+              <a14:hiddenLine xmlns:a14="http://schemas.microsoft.com/office/drawing/2010/main" w="9525">
+                <a:solidFill>
+                  <a:srgbClr val="000000"/>
+                </a:solidFill>
+                <a:miter lim="800000"/>
+                <a:headEnd/>
+                <a:tailEnd/>
+              </a14:hiddenLine>
+            </a:ext>
+          </a:extLst>
+        </p:spPr>
+      </p:pic>
     </p:spTree>
     <p:extLst>
       <p:ext uri="{BB962C8B-B14F-4D97-AF65-F5344CB8AC3E}">
-        <p14:creationId xmlns:p14="http://schemas.microsoft.com/office/powerpoint/2010/main" val="226371856"/>
+        <p14:creationId xmlns:p14="http://schemas.microsoft.com/office/powerpoint/2010/main" val="3483655616"/>
       </p:ext>
     </p:extLst>
   </p:cSld>
@@ -5462,59 +5521,8 @@
         </p:nvSpPr>
         <p:spPr>
           <a:xfrm>
-            <a:off x="457200" y="1628800"/>
-            <a:ext cx="5554960" cy="2088232"/>
-          </a:xfrm>
-        </p:spPr>
-        <p:txBody>
-          <a:bodyPr>
-            <a:normAutofit fontScale="92500" lnSpcReduction="10000"/>
-          </a:bodyPr>
-          <a:lstStyle/>
-          <a:p>
-            <a:endParaRPr lang="pt-BR" sz="3200" dirty="0" smtClean="0"/>
-          </a:p>
-          <a:p>
-            <a:r>
-              <a:rPr lang="pt-BR" sz="3200" dirty="0" smtClean="0"/>
-              <a:t> Selecionados Nutricionista</a:t>
-            </a:r>
-          </a:p>
-          <a:p>
-            <a:r>
-              <a:rPr lang="pt-BR" sz="3200" dirty="0" smtClean="0"/>
-              <a:t>Bons Ruins</a:t>
-            </a:r>
-          </a:p>
-          <a:p>
-            <a:r>
-              <a:rPr lang="pt-BR" sz="3200" dirty="0" smtClean="0"/>
-              <a:t>Posições</a:t>
-            </a:r>
-            <a:endParaRPr lang="pt-BR" sz="3200" dirty="0"/>
-          </a:p>
-          <a:p>
-            <a:endParaRPr lang="pt-BR" sz="3600" dirty="0" smtClean="0"/>
-          </a:p>
-          <a:p>
-            <a:endParaRPr lang="pt-BR" dirty="0" smtClean="0"/>
-          </a:p>
-        </p:txBody>
-      </p:sp>
-      <p:sp>
-        <p:nvSpPr>
-          <p:cNvPr id="3" name="Título 2"/>
-          <p:cNvSpPr>
-            <a:spLocks noGrp="1"/>
-          </p:cNvSpPr>
-          <p:nvPr>
-            <p:ph type="title"/>
-          </p:nvPr>
-        </p:nvSpPr>
-        <p:spPr>
-          <a:xfrm>
-            <a:off x="395536" y="457200"/>
-            <a:ext cx="7200800" cy="1027584"/>
+            <a:off x="457200" y="1628801"/>
+            <a:ext cx="5554960" cy="1656184"/>
           </a:xfrm>
         </p:spPr>
         <p:txBody>
@@ -5523,14 +5531,42 @@
           </a:bodyPr>
           <a:lstStyle/>
           <a:p>
+            <a:endParaRPr lang="pt-BR" sz="3200" dirty="0" smtClean="0"/>
+          </a:p>
+          <a:p>
+            <a:endParaRPr lang="pt-BR" sz="3600" dirty="0" smtClean="0"/>
+          </a:p>
+          <a:p>
+            <a:endParaRPr lang="pt-BR" dirty="0" smtClean="0"/>
+          </a:p>
+        </p:txBody>
+      </p:sp>
+      <p:sp>
+        <p:nvSpPr>
+          <p:cNvPr id="3" name="Título 2"/>
+          <p:cNvSpPr>
+            <a:spLocks noGrp="1"/>
+          </p:cNvSpPr>
+          <p:nvPr>
+            <p:ph type="title"/>
+          </p:nvPr>
+        </p:nvSpPr>
+        <p:spPr>
+          <a:xfrm>
+            <a:off x="395536" y="457200"/>
+            <a:ext cx="7200800" cy="1027584"/>
+          </a:xfrm>
+        </p:spPr>
+        <p:txBody>
+          <a:bodyPr>
+            <a:normAutofit/>
+          </a:bodyPr>
+          <a:lstStyle/>
+          <a:p>
             <a:pPr algn="l"/>
             <a:r>
               <a:rPr lang="pt-BR" sz="4000" dirty="0" smtClean="0"/>
-              <a:t>A</a:t>
-            </a:r>
-            <a:r>
-              <a:rPr lang="pt-BR" sz="4000" dirty="0" smtClean="0"/>
-              <a:t>limentos</a:t>
+              <a:t>Personagens</a:t>
             </a:r>
             <a:endParaRPr lang="pt-BR" sz="4000" dirty="0"/>
           </a:p>
@@ -5538,7 +5574,7 @@
       </p:sp>
       <p:pic>
         <p:nvPicPr>
-          <p:cNvPr id="6146" name="Picture 2" descr="bons"/>
+          <p:cNvPr id="4098" name="Picture 2" descr="pnovo"/>
           <p:cNvPicPr>
             <a:picLocks noChangeAspect="1" noChangeArrowheads="1"/>
           </p:cNvPicPr>
@@ -5559,8 +5595,8 @@
         </p:blipFill>
         <p:spPr bwMode="auto">
           <a:xfrm>
-            <a:off x="1691680" y="3705343"/>
-            <a:ext cx="5930900" cy="300038"/>
+            <a:off x="1187624" y="1628800"/>
+            <a:ext cx="2978150" cy="2289175"/>
           </a:xfrm>
           <a:prstGeom prst="rect">
             <a:avLst/>
@@ -5592,7 +5628,7 @@
       </p:pic>
       <p:pic>
         <p:nvPicPr>
-          <p:cNvPr id="6147" name="Picture 3" descr="ruins"/>
+          <p:cNvPr id="4099" name="Picture 3" descr="bruxa"/>
           <p:cNvPicPr>
             <a:picLocks noChangeAspect="1" noChangeArrowheads="1"/>
           </p:cNvPicPr>
@@ -5613,8 +5649,8 @@
         </p:blipFill>
         <p:spPr bwMode="auto">
           <a:xfrm>
-            <a:off x="2051720" y="4411265"/>
-            <a:ext cx="4498975" cy="339725"/>
+            <a:off x="4499992" y="4077072"/>
+            <a:ext cx="3098800" cy="2071687"/>
           </a:xfrm>
           <a:prstGeom prst="rect">
             <a:avLst/>
@@ -5647,7 +5683,7 @@
     </p:spTree>
     <p:extLst>
       <p:ext uri="{BB962C8B-B14F-4D97-AF65-F5344CB8AC3E}">
-        <p14:creationId xmlns:p14="http://schemas.microsoft.com/office/powerpoint/2010/main" val="2776454512"/>
+        <p14:creationId xmlns:p14="http://schemas.microsoft.com/office/powerpoint/2010/main" val="226371856"/>
       </p:ext>
     </p:extLst>
   </p:cSld>
@@ -5694,7 +5730,58 @@
         <p:spPr>
           <a:xfrm>
             <a:off x="457200" y="1628800"/>
-            <a:ext cx="7211144" cy="3744416"/>
+            <a:ext cx="5554960" cy="2088232"/>
+          </a:xfrm>
+        </p:spPr>
+        <p:txBody>
+          <a:bodyPr>
+            <a:normAutofit fontScale="92500" lnSpcReduction="10000"/>
+          </a:bodyPr>
+          <a:lstStyle/>
+          <a:p>
+            <a:endParaRPr lang="pt-BR" sz="3200" dirty="0" smtClean="0"/>
+          </a:p>
+          <a:p>
+            <a:r>
+              <a:rPr lang="pt-BR" sz="3200" dirty="0" smtClean="0"/>
+              <a:t> Selecionados Nutricionista</a:t>
+            </a:r>
+          </a:p>
+          <a:p>
+            <a:r>
+              <a:rPr lang="pt-BR" sz="3200" dirty="0" smtClean="0"/>
+              <a:t>Bons Ruins</a:t>
+            </a:r>
+          </a:p>
+          <a:p>
+            <a:r>
+              <a:rPr lang="pt-BR" sz="3200" dirty="0" smtClean="0"/>
+              <a:t>Posições</a:t>
+            </a:r>
+            <a:endParaRPr lang="pt-BR" sz="3200" dirty="0"/>
+          </a:p>
+          <a:p>
+            <a:endParaRPr lang="pt-BR" sz="3600" dirty="0" smtClean="0"/>
+          </a:p>
+          <a:p>
+            <a:endParaRPr lang="pt-BR" dirty="0" smtClean="0"/>
+          </a:p>
+        </p:txBody>
+      </p:sp>
+      <p:sp>
+        <p:nvSpPr>
+          <p:cNvPr id="3" name="Título 2"/>
+          <p:cNvSpPr>
+            <a:spLocks noGrp="1"/>
+          </p:cNvSpPr>
+          <p:nvPr>
+            <p:ph type="title"/>
+          </p:nvPr>
+        </p:nvSpPr>
+        <p:spPr>
+          <a:xfrm>
+            <a:off x="395536" y="457200"/>
+            <a:ext cx="7200800" cy="1027584"/>
           </a:xfrm>
         </p:spPr>
         <p:txBody>
@@ -5703,76 +5790,127 @@
           </a:bodyPr>
           <a:lstStyle/>
           <a:p>
-            <a:endParaRPr lang="pt-BR" sz="3200" dirty="0" smtClean="0"/>
-          </a:p>
-          <a:p>
-            <a:r>
-              <a:rPr lang="pt-BR" sz="3200" dirty="0" smtClean="0"/>
-              <a:t> Mapa</a:t>
-            </a:r>
-          </a:p>
-          <a:p>
-            <a:r>
-              <a:rPr lang="pt-BR" sz="3200" dirty="0" smtClean="0"/>
-              <a:t> Pontuação</a:t>
-            </a:r>
-          </a:p>
-          <a:p>
-            <a:r>
-              <a:rPr lang="pt-BR" sz="3200" dirty="0" smtClean="0"/>
-              <a:t> Níveis dificuldade</a:t>
-            </a:r>
-          </a:p>
-          <a:p>
-            <a:r>
-              <a:rPr lang="pt-BR" sz="3200" dirty="0" smtClean="0"/>
-              <a:t> Colisão</a:t>
-            </a:r>
-            <a:endParaRPr lang="pt-BR" sz="3200" dirty="0"/>
-          </a:p>
-          <a:p>
-            <a:endParaRPr lang="pt-BR" sz="3600" dirty="0" smtClean="0"/>
-          </a:p>
-          <a:p>
-            <a:endParaRPr lang="pt-BR" dirty="0" smtClean="0"/>
-          </a:p>
-        </p:txBody>
-      </p:sp>
-      <p:sp>
-        <p:nvSpPr>
-          <p:cNvPr id="3" name="Título 2"/>
-          <p:cNvSpPr>
-            <a:spLocks noGrp="1"/>
-          </p:cNvSpPr>
-          <p:nvPr>
-            <p:ph type="title"/>
-          </p:nvPr>
-        </p:nvSpPr>
-        <p:spPr>
-          <a:xfrm>
-            <a:off x="395536" y="457200"/>
-            <a:ext cx="7200800" cy="1027584"/>
-          </a:xfrm>
-        </p:spPr>
-        <p:txBody>
-          <a:bodyPr>
-            <a:normAutofit/>
-          </a:bodyPr>
-          <a:lstStyle/>
-          <a:p>
             <a:pPr algn="l"/>
             <a:r>
-              <a:rPr lang="pt-BR" sz="4000" dirty="0"/>
-              <a:t>Projeto/Desenvolvimento </a:t>
+              <a:rPr lang="pt-BR" sz="4000" dirty="0" smtClean="0"/>
+              <a:t>Alimentos</a:t>
             </a:r>
             <a:endParaRPr lang="pt-BR" sz="4000" dirty="0"/>
           </a:p>
         </p:txBody>
       </p:sp>
+      <p:pic>
+        <p:nvPicPr>
+          <p:cNvPr id="6146" name="Picture 2" descr="bons"/>
+          <p:cNvPicPr>
+            <a:picLocks noChangeAspect="1" noChangeArrowheads="1"/>
+          </p:cNvPicPr>
+          <p:nvPr/>
+        </p:nvPicPr>
+        <p:blipFill>
+          <a:blip r:embed="rId2">
+            <a:extLst>
+              <a:ext uri="{28A0092B-C50C-407E-A947-70E740481C1C}">
+                <a14:useLocalDpi xmlns:a14="http://schemas.microsoft.com/office/drawing/2010/main" val="0"/>
+              </a:ext>
+            </a:extLst>
+          </a:blip>
+          <a:srcRect/>
+          <a:stretch>
+            <a:fillRect/>
+          </a:stretch>
+        </p:blipFill>
+        <p:spPr bwMode="auto">
+          <a:xfrm>
+            <a:off x="1691680" y="3705343"/>
+            <a:ext cx="5930900" cy="300038"/>
+          </a:xfrm>
+          <a:prstGeom prst="rect">
+            <a:avLst/>
+          </a:prstGeom>
+          <a:noFill/>
+          <a:ln>
+            <a:noFill/>
+          </a:ln>
+          <a:extLst>
+            <a:ext uri="{909E8E84-426E-40DD-AFC4-6F175D3DCCD1}">
+              <a14:hiddenFill xmlns:a14="http://schemas.microsoft.com/office/drawing/2010/main">
+                <a:solidFill>
+                  <a:srgbClr val="FFFFFF"/>
+                </a:solidFill>
+              </a14:hiddenFill>
+            </a:ext>
+            <a:ext uri="{91240B29-F687-4F45-9708-019B960494DF}">
+              <a14:hiddenLine xmlns:a14="http://schemas.microsoft.com/office/drawing/2010/main" w="9525">
+                <a:solidFill>
+                  <a:srgbClr val="000000"/>
+                </a:solidFill>
+                <a:miter lim="800000"/>
+                <a:headEnd/>
+                <a:tailEnd/>
+              </a14:hiddenLine>
+            </a:ext>
+          </a:extLst>
+        </p:spPr>
+      </p:pic>
+      <p:pic>
+        <p:nvPicPr>
+          <p:cNvPr id="6147" name="Picture 3" descr="ruins"/>
+          <p:cNvPicPr>
+            <a:picLocks noChangeAspect="1" noChangeArrowheads="1"/>
+          </p:cNvPicPr>
+          <p:nvPr/>
+        </p:nvPicPr>
+        <p:blipFill>
+          <a:blip r:embed="rId3">
+            <a:extLst>
+              <a:ext uri="{28A0092B-C50C-407E-A947-70E740481C1C}">
+                <a14:useLocalDpi xmlns:a14="http://schemas.microsoft.com/office/drawing/2010/main" val="0"/>
+              </a:ext>
+            </a:extLst>
+          </a:blip>
+          <a:srcRect/>
+          <a:stretch>
+            <a:fillRect/>
+          </a:stretch>
+        </p:blipFill>
+        <p:spPr bwMode="auto">
+          <a:xfrm>
+            <a:off x="2051720" y="4411265"/>
+            <a:ext cx="4498975" cy="339725"/>
+          </a:xfrm>
+          <a:prstGeom prst="rect">
+            <a:avLst/>
+          </a:prstGeom>
+          <a:noFill/>
+          <a:ln>
+            <a:noFill/>
+          </a:ln>
+          <a:extLst>
+            <a:ext uri="{909E8E84-426E-40DD-AFC4-6F175D3DCCD1}">
+              <a14:hiddenFill xmlns:a14="http://schemas.microsoft.com/office/drawing/2010/main">
+                <a:solidFill>
+                  <a:srgbClr val="FFFFFF"/>
+                </a:solidFill>
+              </a14:hiddenFill>
+            </a:ext>
+            <a:ext uri="{91240B29-F687-4F45-9708-019B960494DF}">
+              <a14:hiddenLine xmlns:a14="http://schemas.microsoft.com/office/drawing/2010/main" w="9525">
+                <a:solidFill>
+                  <a:srgbClr val="000000"/>
+                </a:solidFill>
+                <a:miter lim="800000"/>
+                <a:headEnd/>
+                <a:tailEnd/>
+              </a14:hiddenLine>
+            </a:ext>
+          </a:extLst>
+        </p:spPr>
+      </p:pic>
     </p:spTree>
     <p:extLst>
       <p:ext uri="{BB962C8B-B14F-4D97-AF65-F5344CB8AC3E}">
-        <p14:creationId xmlns:p14="http://schemas.microsoft.com/office/powerpoint/2010/main" val="994906556"/>
+        <p14:creationId xmlns:p14="http://schemas.microsoft.com/office/powerpoint/2010/main" val="2776454512"/>
       </p:ext>
     </p:extLst>
   </p:cSld>
@@ -5832,79 +5970,28 @@
           </a:p>
           <a:p>
             <a:r>
-              <a:rPr lang="pt-BR" sz="3200" dirty="0"/>
-              <a:t> </a:t>
-            </a:r>
-            <a:r>
               <a:rPr lang="pt-BR" sz="3200" dirty="0" smtClean="0"/>
-              <a:t>Histórico desenvolvimento</a:t>
-            </a:r>
-          </a:p>
-          <a:p>
-            <a:pPr lvl="1"/>
-            <a:r>
-              <a:rPr lang="pt-BR" sz="2800" dirty="0" smtClean="0"/>
-              <a:t>Curso extensão </a:t>
-            </a:r>
-          </a:p>
-          <a:p>
-            <a:pPr lvl="1"/>
-            <a:r>
-              <a:rPr lang="pt-BR" sz="2800" dirty="0" smtClean="0"/>
-              <a:t> Nenhum recurso externo</a:t>
-            </a:r>
-          </a:p>
-          <a:p>
-            <a:pPr lvl="1"/>
-            <a:r>
-              <a:rPr lang="pt-BR" sz="2800" dirty="0" smtClean="0"/>
-              <a:t>Classes</a:t>
-            </a:r>
-          </a:p>
-          <a:p>
-            <a:pPr marL="228600" lvl="1" indent="0">
-              <a:buNone/>
-            </a:pPr>
-            <a:r>
-              <a:rPr lang="pt-BR" sz="2400" dirty="0" smtClean="0">
-                <a:solidFill>
-                  <a:schemeClr val="tx1"/>
-                </a:solidFill>
-              </a:rPr>
-              <a:t>“</a:t>
-            </a:r>
-            <a:r>
-              <a:rPr lang="pt-BR" sz="2400" dirty="0" err="1">
-                <a:solidFill>
-                  <a:schemeClr val="tx1"/>
-                </a:solidFill>
-              </a:rPr>
-              <a:t>GameCanvas</a:t>
-            </a:r>
-            <a:r>
-              <a:rPr lang="pt-BR" sz="2400" dirty="0" smtClean="0">
-                <a:solidFill>
-                  <a:schemeClr val="tx1"/>
-                </a:solidFill>
-              </a:rPr>
-              <a:t>”, “</a:t>
-            </a:r>
-            <a:r>
-              <a:rPr lang="pt-BR" sz="2400" dirty="0" err="1" smtClean="0">
-                <a:solidFill>
-                  <a:schemeClr val="tx1"/>
-                </a:solidFill>
-              </a:rPr>
-              <a:t>GamePanel</a:t>
-            </a:r>
-            <a:r>
-              <a:rPr lang="pt-BR" sz="2400" dirty="0" smtClean="0">
-                <a:solidFill>
-                  <a:schemeClr val="tx1"/>
-                </a:solidFill>
-              </a:rPr>
-              <a:t>”</a:t>
-            </a:r>
+              <a:t> Mapa</a:t>
+            </a:r>
+          </a:p>
+          <a:p>
+            <a:r>
+              <a:rPr lang="pt-BR" sz="3200" dirty="0" smtClean="0"/>
+              <a:t> Pontuação</a:t>
+            </a:r>
+          </a:p>
+          <a:p>
+            <a:r>
+              <a:rPr lang="pt-BR" sz="3200" dirty="0" smtClean="0"/>
+              <a:t> Níveis dificuldade</a:t>
+            </a:r>
+          </a:p>
+          <a:p>
+            <a:r>
+              <a:rPr lang="pt-BR" sz="3200" dirty="0" smtClean="0"/>
+              <a:t> Colisão</a:t>
+            </a:r>
+            <a:endParaRPr lang="pt-BR" sz="3200" dirty="0"/>
           </a:p>
           <a:p>
             <a:endParaRPr lang="pt-BR" sz="3600" dirty="0" smtClean="0"/>
@@ -5941,14 +6028,13 @@
               <a:rPr lang="pt-BR" sz="4000" dirty="0"/>
               <a:t>Projeto/Desenvolvimento </a:t>
             </a:r>
-            <a:endParaRPr lang="pt-BR" sz="4000" dirty="0"/>
           </a:p>
         </p:txBody>
       </p:sp>
     </p:spTree>
     <p:extLst>
       <p:ext uri="{BB962C8B-B14F-4D97-AF65-F5344CB8AC3E}">
-        <p14:creationId xmlns:p14="http://schemas.microsoft.com/office/powerpoint/2010/main" val="722848786"/>
+        <p14:creationId xmlns:p14="http://schemas.microsoft.com/office/powerpoint/2010/main" val="994906556"/>
       </p:ext>
     </p:extLst>
   </p:cSld>
@@ -6014,7 +6100,6 @@
               <a:rPr lang="pt-BR" sz="2800" dirty="0" smtClean="0"/>
               <a:t>Objetivos </a:t>
             </a:r>
-            <a:endParaRPr lang="pt-BR" sz="2800" dirty="0" smtClean="0"/>
           </a:p>
           <a:p>
             <a:r>
@@ -6043,15 +6128,7 @@
             </a:pPr>
             <a:r>
               <a:rPr lang="pt-BR" sz="2800" dirty="0" smtClean="0"/>
-              <a:t>Jogos </a:t>
-            </a:r>
-            <a:r>
-              <a:rPr lang="pt-BR" sz="2800" dirty="0" smtClean="0"/>
-              <a:t>Digitais </a:t>
-            </a:r>
-            <a:r>
-              <a:rPr lang="pt-BR" sz="2800" dirty="0" smtClean="0"/>
-              <a:t>Inteligência Artificial </a:t>
+              <a:t>Jogos Digitais Inteligência Artificial </a:t>
             </a:r>
           </a:p>
           <a:p>
@@ -6059,25 +6136,18 @@
               <a:rPr lang="pt-BR" sz="2800" dirty="0" smtClean="0"/>
               <a:t>Projeto/Desenvolvimento</a:t>
             </a:r>
-            <a:endParaRPr lang="pt-BR" sz="2800" dirty="0" smtClean="0"/>
           </a:p>
           <a:p>
             <a:r>
               <a:rPr lang="pt-BR" sz="2800" dirty="0" smtClean="0"/>
-              <a:t>Considerações </a:t>
-            </a:r>
-            <a:r>
-              <a:rPr lang="pt-BR" sz="2800" dirty="0" smtClean="0"/>
-              <a:t>Finais </a:t>
-            </a:r>
-            <a:endParaRPr lang="pt-BR" sz="2800" dirty="0" smtClean="0"/>
+              <a:t>Considerações Finais </a:t>
+            </a:r>
           </a:p>
           <a:p>
             <a:r>
               <a:rPr lang="pt-BR" sz="2800" dirty="0" smtClean="0"/>
               <a:t>Trabalhos Futuros</a:t>
             </a:r>
-            <a:endParaRPr lang="pt-BR" sz="2800" dirty="0" smtClean="0"/>
           </a:p>
           <a:p>
             <a:endParaRPr lang="pt-BR" dirty="0"/>
@@ -7495,11 +7565,7 @@
           <a:p>
             <a:r>
               <a:rPr lang="pt-BR" sz="4800" dirty="0" smtClean="0"/>
-              <a:t>Proporcionar </a:t>
-            </a:r>
-            <a:r>
-              <a:rPr lang="pt-BR" sz="4800" dirty="0" smtClean="0"/>
-              <a:t>entretenimento e diversão </a:t>
+              <a:t>Proporcionar entretenimento e diversão </a:t>
             </a:r>
           </a:p>
           <a:p>

</xml_diff>